<commit_message>
Updated the Jupyter notebook with new analysis and saved the data
</commit_message>
<xml_diff>
--- a/presentation.pdf.pptx
+++ b/presentation.pdf.pptx
@@ -4402,16 +4402,7 @@
                 <a:ea typeface="Calibri" panose="020F0502020204030204" pitchFamily="34" charset="0"/>
                 <a:cs typeface="Times New Roman" panose="02020603050405020304" pitchFamily="18" charset="0"/>
               </a:rPr>
-              <a:t>Choose aircraft with a record of mechanical </a:t>
-            </a:r>
-            <a:r>
-              <a:rPr lang="en-US" kern="100">
-                <a:effectLst/>
-                <a:latin typeface="Calibri" panose="020F0502020204030204" pitchFamily="34" charset="0"/>
-                <a:ea typeface="Calibri" panose="020F0502020204030204" pitchFamily="34" charset="0"/>
-                <a:cs typeface="Times New Roman" panose="02020603050405020304" pitchFamily="18" charset="0"/>
-              </a:rPr>
-              <a:t>reliability.</a:t>
+              <a:t>Choose aircraft with a record of mechanical reliability.</a:t>
             </a:r>
           </a:p>
           <a:p>
@@ -4427,22 +4418,13 @@
               </a:tabLst>
             </a:pPr>
             <a:r>
-              <a:rPr lang="en-US" kern="100">
-                <a:effectLst/>
-                <a:latin typeface="Calibri" panose="020F0502020204030204" pitchFamily="34" charset="0"/>
-                <a:ea typeface="Calibri" panose="020F0502020204030204" pitchFamily="34" charset="0"/>
-                <a:cs typeface="Times New Roman" panose="02020603050405020304" pitchFamily="18" charset="0"/>
-              </a:rPr>
-              <a:t>Implement </a:t>
-            </a:r>
-            <a:r>
               <a:rPr lang="en-US" kern="100" dirty="0">
                 <a:effectLst/>
                 <a:latin typeface="Calibri" panose="020F0502020204030204" pitchFamily="34" charset="0"/>
                 <a:ea typeface="Calibri" panose="020F0502020204030204" pitchFamily="34" charset="0"/>
                 <a:cs typeface="Times New Roman" panose="02020603050405020304" pitchFamily="18" charset="0"/>
               </a:rPr>
-              <a:t>strict weather-related flight operation protocols.</a:t>
+              <a:t>Implement strict weather-related flight operation protocols.</a:t>
             </a:r>
           </a:p>
           <a:p>

</xml_diff>